<commit_message>
fixed reference to OracleDB in PostgreSQL slide
</commit_message>
<xml_diff>
--- a/deck/dms-workshop-sql.pptx
+++ b/deck/dms-workshop-sql.pptx
@@ -357,7 +357,7 @@
             <a:fld id="{0B25AC41-3BEC-9247-8322-91B80C013F2D}" type="datetimeFigureOut">
               <a:rPr lang="en-US" smtClean="0"/>
               <a:pPr/>
-              <a:t>10/26/17</a:t>
+              <a:t>11/8/17</a:t>
             </a:fld>
             <a:endParaRPr lang="en-US" dirty="0"/>
           </a:p>
@@ -4890,15 +4890,7 @@
                 <a:ea typeface="Amazon Ember Light" charset="0"/>
                 <a:cs typeface="Amazon Ember Light" charset="0"/>
               </a:rPr>
-              <a:t>Revised </a:t>
-            </a:r>
-            <a:r>
-              <a:rPr lang="en-US" dirty="0" smtClean="0">
-                <a:latin typeface="Amazon Ember Light" charset="0"/>
-                <a:ea typeface="Amazon Ember Light" charset="0"/>
-                <a:cs typeface="Amazon Ember Light" charset="0"/>
-              </a:rPr>
-              <a:t>2017.10.26</a:t>
+              <a:t>Revised 2017.10.26</a:t>
             </a:r>
             <a:endParaRPr lang="en-US" dirty="0">
               <a:latin typeface="Amazon Ember Light" charset="0"/>
@@ -5169,23 +5161,7 @@
                 <a:ea typeface="Amazon Ember Light" charset="0"/>
                 <a:cs typeface="Amazon Ember Light" charset="0"/>
               </a:rPr>
-              <a:t> Install AWS SCT, </a:t>
-            </a:r>
-            <a:r>
-              <a:rPr lang="en-US" dirty="0" smtClean="0">
-                <a:latin typeface="Amazon Ember Light" charset="0"/>
-                <a:ea typeface="Amazon Ember Light" charset="0"/>
-                <a:cs typeface="Amazon Ember Light" charset="0"/>
-              </a:rPr>
-              <a:t>JDBC drivers and database </a:t>
-            </a:r>
-            <a:r>
-              <a:rPr lang="en-US" dirty="0" smtClean="0">
-                <a:latin typeface="Amazon Ember Light" charset="0"/>
-                <a:ea typeface="Amazon Ember Light" charset="0"/>
-                <a:cs typeface="Amazon Ember Light" charset="0"/>
-              </a:rPr>
-              <a:t>tools locally</a:t>
+              <a:t> Install AWS SCT, JDBC drivers and database tools locally</a:t>
             </a:r>
           </a:p>
         </p:txBody>
@@ -6588,7 +6564,31 @@
                 <a:ea typeface="Amazon Ember Light" charset="0"/>
                 <a:cs typeface="Amazon Ember Light" charset="0"/>
               </a:rPr>
-              <a:t>AWS DMS and AWS SCT offer support for Oracle DB as both source and </a:t>
+              <a:t>AWS DMS and AWS SCT offer support </a:t>
+            </a:r>
+            <a:r>
+              <a:rPr lang="en-US" sz="1800">
+                <a:latin typeface="Amazon Ember Light" charset="0"/>
+                <a:ea typeface="Amazon Ember Light" charset="0"/>
+                <a:cs typeface="Amazon Ember Light" charset="0"/>
+              </a:rPr>
+              <a:t>for </a:t>
+            </a:r>
+            <a:r>
+              <a:rPr lang="en-US" sz="1800" smtClean="0">
+                <a:latin typeface="Amazon Ember Light" charset="0"/>
+                <a:ea typeface="Amazon Ember Light" charset="0"/>
+                <a:cs typeface="Amazon Ember Light" charset="0"/>
+              </a:rPr>
+              <a:t>PostgreSQL </a:t>
+            </a:r>
+            <a:r>
+              <a:rPr lang="en-US" sz="1800" dirty="0">
+                <a:latin typeface="Amazon Ember Light" charset="0"/>
+                <a:ea typeface="Amazon Ember Light" charset="0"/>
+                <a:cs typeface="Amazon Ember Light" charset="0"/>
+              </a:rPr>
+              <a:t>DB as both source and </a:t>
             </a:r>
             <a:r>
               <a:rPr lang="en-US" sz="1800" dirty="0" smtClean="0">

</xml_diff>